<commit_message>
ppt and certificates added
</commit_message>
<xml_diff>
--- a/whitecode/ppt/webinar-whiteCode.pptx
+++ b/whitecode/ppt/webinar-whiteCode.pptx
@@ -6,7 +6,7 @@
   </p:sldMasterIdLst>
   <p:sldIdLst>
     <p:sldId id="256" r:id="rId2"/>
-    <p:sldId id="257" r:id="rId3"/>
+    <p:sldId id="258" r:id="rId3"/>
   </p:sldIdLst>
   <p:sldSz cx="16259175" cy="9145588"/>
   <p:notesSz cx="6858000" cy="9144000"/>
@@ -467,7 +467,8 @@
           <a:p>
             <a:fld id="{89AFDEE8-6950-4D78-BADE-65E0F9F91909}" type="datetimeFigureOut">
               <a:rPr lang="en-US" smtClean="0"/>
-              <a:t>6/12/2020</a:t>
+              <a:pPr/>
+              <a:t>6/15/2020</a:t>
             </a:fld>
             <a:endParaRPr lang="en-US"/>
           </a:p>
@@ -509,6 +510,7 @@
           <a:p>
             <a:fld id="{E6D0FE1C-B516-464E-88C3-9253316E634F}" type="slidenum">
               <a:rPr lang="en-US" smtClean="0"/>
+              <a:pPr/>
               <a:t>‹#›</a:t>
             </a:fld>
             <a:endParaRPr lang="en-US"/>
@@ -642,7 +644,8 @@
           <a:p>
             <a:fld id="{89AFDEE8-6950-4D78-BADE-65E0F9F91909}" type="datetimeFigureOut">
               <a:rPr lang="en-US" smtClean="0"/>
-              <a:t>6/12/2020</a:t>
+              <a:pPr/>
+              <a:t>6/15/2020</a:t>
             </a:fld>
             <a:endParaRPr lang="en-US"/>
           </a:p>
@@ -684,6 +687,7 @@
           <a:p>
             <a:fld id="{E6D0FE1C-B516-464E-88C3-9253316E634F}" type="slidenum">
               <a:rPr lang="en-US" smtClean="0"/>
+              <a:pPr/>
               <a:t>‹#›</a:t>
             </a:fld>
             <a:endParaRPr lang="en-US"/>
@@ -807,7 +811,8 @@
           <a:p>
             <a:fld id="{89AFDEE8-6950-4D78-BADE-65E0F9F91909}" type="datetimeFigureOut">
               <a:rPr lang="en-US" smtClean="0"/>
-              <a:t>6/12/2020</a:t>
+              <a:pPr/>
+              <a:t>6/15/2020</a:t>
             </a:fld>
             <a:endParaRPr lang="en-US"/>
           </a:p>
@@ -849,6 +854,7 @@
           <a:p>
             <a:fld id="{E6D0FE1C-B516-464E-88C3-9253316E634F}" type="slidenum">
               <a:rPr lang="en-US" smtClean="0"/>
+              <a:pPr/>
               <a:t>‹#›</a:t>
             </a:fld>
             <a:endParaRPr lang="en-US"/>
@@ -1048,7 +1054,8 @@
           <a:p>
             <a:fld id="{89AFDEE8-6950-4D78-BADE-65E0F9F91909}" type="datetimeFigureOut">
               <a:rPr lang="en-US" smtClean="0"/>
-              <a:t>6/12/2020</a:t>
+              <a:pPr/>
+              <a:t>6/15/2020</a:t>
             </a:fld>
             <a:endParaRPr lang="en-US"/>
           </a:p>
@@ -1090,6 +1097,7 @@
           <a:p>
             <a:fld id="{E6D0FE1C-B516-464E-88C3-9253316E634F}" type="slidenum">
               <a:rPr lang="en-US" smtClean="0"/>
+              <a:pPr/>
               <a:t>‹#›</a:t>
             </a:fld>
             <a:endParaRPr lang="en-US"/>
@@ -1331,7 +1339,8 @@
           <a:p>
             <a:fld id="{89AFDEE8-6950-4D78-BADE-65E0F9F91909}" type="datetimeFigureOut">
               <a:rPr lang="en-US" smtClean="0"/>
-              <a:t>6/12/2020</a:t>
+              <a:pPr/>
+              <a:t>6/15/2020</a:t>
             </a:fld>
             <a:endParaRPr lang="en-US"/>
           </a:p>
@@ -1373,6 +1382,7 @@
           <a:p>
             <a:fld id="{E6D0FE1C-B516-464E-88C3-9253316E634F}" type="slidenum">
               <a:rPr lang="en-US" smtClean="0"/>
+              <a:pPr/>
               <a:t>‹#›</a:t>
             </a:fld>
             <a:endParaRPr lang="en-US"/>
@@ -1748,7 +1758,8 @@
           <a:p>
             <a:fld id="{89AFDEE8-6950-4D78-BADE-65E0F9F91909}" type="datetimeFigureOut">
               <a:rPr lang="en-US" smtClean="0"/>
-              <a:t>6/12/2020</a:t>
+              <a:pPr/>
+              <a:t>6/15/2020</a:t>
             </a:fld>
             <a:endParaRPr lang="en-US"/>
           </a:p>
@@ -1790,6 +1801,7 @@
           <a:p>
             <a:fld id="{E6D0FE1C-B516-464E-88C3-9253316E634F}" type="slidenum">
               <a:rPr lang="en-US" smtClean="0"/>
+              <a:pPr/>
               <a:t>‹#›</a:t>
             </a:fld>
             <a:endParaRPr lang="en-US"/>
@@ -1861,7 +1873,8 @@
           <a:p>
             <a:fld id="{89AFDEE8-6950-4D78-BADE-65E0F9F91909}" type="datetimeFigureOut">
               <a:rPr lang="en-US" smtClean="0"/>
-              <a:t>6/12/2020</a:t>
+              <a:pPr/>
+              <a:t>6/15/2020</a:t>
             </a:fld>
             <a:endParaRPr lang="en-US"/>
           </a:p>
@@ -1903,6 +1916,7 @@
           <a:p>
             <a:fld id="{E6D0FE1C-B516-464E-88C3-9253316E634F}" type="slidenum">
               <a:rPr lang="en-US" smtClean="0"/>
+              <a:pPr/>
               <a:t>‹#›</a:t>
             </a:fld>
             <a:endParaRPr lang="en-US"/>
@@ -1951,7 +1965,8 @@
           <a:p>
             <a:fld id="{89AFDEE8-6950-4D78-BADE-65E0F9F91909}" type="datetimeFigureOut">
               <a:rPr lang="en-US" smtClean="0"/>
-              <a:t>6/12/2020</a:t>
+              <a:pPr/>
+              <a:t>6/15/2020</a:t>
             </a:fld>
             <a:endParaRPr lang="en-US"/>
           </a:p>
@@ -1993,6 +2008,7 @@
           <a:p>
             <a:fld id="{E6D0FE1C-B516-464E-88C3-9253316E634F}" type="slidenum">
               <a:rPr lang="en-US" smtClean="0"/>
+              <a:pPr/>
               <a:t>‹#›</a:t>
             </a:fld>
             <a:endParaRPr lang="en-US"/>
@@ -2223,7 +2239,8 @@
           <a:p>
             <a:fld id="{89AFDEE8-6950-4D78-BADE-65E0F9F91909}" type="datetimeFigureOut">
               <a:rPr lang="en-US" smtClean="0"/>
-              <a:t>6/12/2020</a:t>
+              <a:pPr/>
+              <a:t>6/15/2020</a:t>
             </a:fld>
             <a:endParaRPr lang="en-US"/>
           </a:p>
@@ -2265,6 +2282,7 @@
           <a:p>
             <a:fld id="{E6D0FE1C-B516-464E-88C3-9253316E634F}" type="slidenum">
               <a:rPr lang="en-US" smtClean="0"/>
+              <a:pPr/>
               <a:t>‹#›</a:t>
             </a:fld>
             <a:endParaRPr lang="en-US"/>
@@ -2471,7 +2489,8 @@
           <a:p>
             <a:fld id="{89AFDEE8-6950-4D78-BADE-65E0F9F91909}" type="datetimeFigureOut">
               <a:rPr lang="en-US" smtClean="0"/>
-              <a:t>6/12/2020</a:t>
+              <a:pPr/>
+              <a:t>6/15/2020</a:t>
             </a:fld>
             <a:endParaRPr lang="en-US"/>
           </a:p>
@@ -2513,6 +2532,7 @@
           <a:p>
             <a:fld id="{E6D0FE1C-B516-464E-88C3-9253316E634F}" type="slidenum">
               <a:rPr lang="en-US" smtClean="0"/>
+              <a:pPr/>
               <a:t>‹#›</a:t>
             </a:fld>
             <a:endParaRPr lang="en-US"/>
@@ -2686,7 +2706,8 @@
           <a:p>
             <a:fld id="{89AFDEE8-6950-4D78-BADE-65E0F9F91909}" type="datetimeFigureOut">
               <a:rPr lang="en-US" smtClean="0"/>
-              <a:t>6/12/2020</a:t>
+              <a:pPr/>
+              <a:t>6/15/2020</a:t>
             </a:fld>
             <a:endParaRPr lang="en-US"/>
           </a:p>
@@ -2764,6 +2785,7 @@
           <a:p>
             <a:fld id="{E6D0FE1C-B516-464E-88C3-9253316E634F}" type="slidenum">
               <a:rPr lang="en-US" smtClean="0"/>
+              <a:pPr/>
               <a:t>‹#›</a:t>
             </a:fld>
             <a:endParaRPr lang="en-US"/>
@@ -3956,42 +3978,1033 @@
       </p:grpSpPr>
       <p:sp>
         <p:nvSpPr>
-          <p:cNvPr id="2" name="Title 1"/>
-          <p:cNvSpPr>
-            <a:spLocks noGrp="1"/>
-          </p:cNvSpPr>
-          <p:nvPr>
-            <p:ph type="title"/>
-          </p:nvPr>
-        </p:nvSpPr>
-        <p:spPr/>
-        <p:txBody>
-          <a:bodyPr/>
-          <a:lstStyle/>
-          <a:p>
-            <a:endParaRPr lang="en-US"/>
-          </a:p>
-        </p:txBody>
-      </p:sp>
-      <p:sp>
-        <p:nvSpPr>
-          <p:cNvPr id="3" name="Content Placeholder 2"/>
-          <p:cNvSpPr>
-            <a:spLocks noGrp="1"/>
-          </p:cNvSpPr>
-          <p:nvPr>
-            <p:ph idx="1"/>
-          </p:nvPr>
-        </p:nvSpPr>
-        <p:spPr/>
-        <p:txBody>
-          <a:bodyPr/>
-          <a:lstStyle/>
-          <a:p>
-            <a:endParaRPr lang="en-US"/>
-          </a:p>
-        </p:txBody>
-      </p:sp>
+          <p:cNvPr id="70" name="Rounded Rectangle 69"/>
+          <p:cNvSpPr/>
+          <p:nvPr/>
+        </p:nvSpPr>
+        <p:spPr>
+          <a:xfrm>
+            <a:off x="1414415" y="2072464"/>
+            <a:ext cx="3143271" cy="4357718"/>
+          </a:xfrm>
+          <a:prstGeom prst="roundRect">
+            <a:avLst>
+              <a:gd name="adj" fmla="val 8751"/>
+            </a:avLst>
+          </a:prstGeom>
+          <a:solidFill>
+            <a:srgbClr val="C3D0E5"/>
+          </a:solidFill>
+          <a:ln>
+            <a:noFill/>
+          </a:ln>
+          <a:effectLst>
+            <a:outerShdw blurRad="50800" dist="38100" dir="2700000" algn="tl" rotWithShape="0">
+              <a:prstClr val="black">
+                <a:alpha val="40000"/>
+              </a:prstClr>
+            </a:outerShdw>
+          </a:effectLst>
+        </p:spPr>
+        <p:style>
+          <a:lnRef idx="2">
+            <a:schemeClr val="accent1">
+              <a:shade val="50000"/>
+            </a:schemeClr>
+          </a:lnRef>
+          <a:fillRef idx="1">
+            <a:schemeClr val="accent1"/>
+          </a:fillRef>
+          <a:effectRef idx="0">
+            <a:schemeClr val="accent1"/>
+          </a:effectRef>
+          <a:fontRef idx="minor">
+            <a:schemeClr val="lt1"/>
+          </a:fontRef>
+        </p:style>
+        <p:txBody>
+          <a:bodyPr rtlCol="0" anchor="ctr"/>
+          <a:lstStyle/>
+          <a:p>
+            <a:pPr algn="ctr"/>
+            <a:endParaRPr lang="en-US" b="1" dirty="0">
+              <a:ln w="18000">
+                <a:solidFill>
+                  <a:schemeClr val="accent2">
+                    <a:satMod val="140000"/>
+                  </a:schemeClr>
+                </a:solidFill>
+                <a:prstDash val="solid"/>
+                <a:miter lim="800000"/>
+              </a:ln>
+              <a:noFill/>
+              <a:effectLst>
+                <a:outerShdw blurRad="25500" dist="23000" dir="7020000" algn="tl">
+                  <a:srgbClr val="000000">
+                    <a:alpha val="50000"/>
+                  </a:srgbClr>
+                </a:outerShdw>
+              </a:effectLst>
+            </a:endParaRPr>
+          </a:p>
+        </p:txBody>
+      </p:sp>
+      <p:sp>
+        <p:nvSpPr>
+          <p:cNvPr id="71" name="Rectangle 70"/>
+          <p:cNvSpPr/>
+          <p:nvPr/>
+        </p:nvSpPr>
+        <p:spPr>
+          <a:xfrm>
+            <a:off x="1414415" y="4929984"/>
+            <a:ext cx="3143272" cy="502231"/>
+          </a:xfrm>
+          <a:prstGeom prst="rect">
+            <a:avLst/>
+          </a:prstGeom>
+          <a:solidFill>
+            <a:srgbClr val="F6A944"/>
+          </a:solidFill>
+          <a:ln>
+            <a:noFill/>
+          </a:ln>
+        </p:spPr>
+        <p:style>
+          <a:lnRef idx="2">
+            <a:schemeClr val="accent1">
+              <a:shade val="50000"/>
+            </a:schemeClr>
+          </a:lnRef>
+          <a:fillRef idx="1">
+            <a:schemeClr val="accent1"/>
+          </a:fillRef>
+          <a:effectRef idx="0">
+            <a:schemeClr val="accent1"/>
+          </a:effectRef>
+          <a:fontRef idx="minor">
+            <a:schemeClr val="lt1"/>
+          </a:fontRef>
+        </p:style>
+        <p:txBody>
+          <a:bodyPr rtlCol="0" anchor="ctr"/>
+          <a:lstStyle/>
+          <a:p>
+            <a:pPr algn="ctr"/>
+            <a:endParaRPr lang="en-US" dirty="0">
+              <a:solidFill>
+                <a:schemeClr val="accent4">
+                  <a:lumMod val="40000"/>
+                  <a:lumOff val="60000"/>
+                </a:schemeClr>
+              </a:solidFill>
+            </a:endParaRPr>
+          </a:p>
+        </p:txBody>
+      </p:sp>
+      <p:pic>
+        <p:nvPicPr>
+          <p:cNvPr id="1026" name="Picture 2"/>
+          <p:cNvPicPr>
+            <a:picLocks noChangeAspect="1" noChangeArrowheads="1"/>
+          </p:cNvPicPr>
+          <p:nvPr/>
+        </p:nvPicPr>
+        <p:blipFill>
+          <a:blip r:embed="rId2"/>
+          <a:srcRect/>
+          <a:stretch>
+            <a:fillRect/>
+          </a:stretch>
+        </p:blipFill>
+        <p:spPr bwMode="auto">
+          <a:xfrm>
+            <a:off x="1940910" y="2358216"/>
+            <a:ext cx="2045273" cy="2338852"/>
+          </a:xfrm>
+          <a:prstGeom prst="rect">
+            <a:avLst/>
+          </a:prstGeom>
+          <a:noFill/>
+          <a:ln w="9525">
+            <a:solidFill>
+              <a:srgbClr val="0C1B3A"/>
+            </a:solidFill>
+            <a:miter lim="800000"/>
+            <a:headEnd/>
+            <a:tailEnd/>
+          </a:ln>
+          <a:effectLst>
+            <a:softEdge rad="12700"/>
+          </a:effectLst>
+        </p:spPr>
+      </p:pic>
+      <p:sp>
+        <p:nvSpPr>
+          <p:cNvPr id="31" name="Rectangle 30"/>
+          <p:cNvSpPr/>
+          <p:nvPr/>
+        </p:nvSpPr>
+        <p:spPr>
+          <a:xfrm>
+            <a:off x="1599010" y="5430050"/>
+            <a:ext cx="2815801" cy="701731"/>
+          </a:xfrm>
+          <a:prstGeom prst="rect">
+            <a:avLst/>
+          </a:prstGeom>
+        </p:spPr>
+        <p:txBody>
+          <a:bodyPr wrap="square">
+            <a:spAutoFit/>
+          </a:bodyPr>
+          <a:lstStyle/>
+          <a:p>
+            <a:pPr algn="ctr">
+              <a:lnSpc>
+                <a:spcPct val="90000"/>
+              </a:lnSpc>
+            </a:pPr>
+            <a:r>
+              <a:rPr lang="en-US" sz="2200" dirty="0" smtClean="0"/>
+              <a:t>Resource Admin</a:t>
+            </a:r>
+          </a:p>
+          <a:p>
+            <a:pPr algn="ctr">
+              <a:lnSpc>
+                <a:spcPct val="90000"/>
+              </a:lnSpc>
+            </a:pPr>
+            <a:r>
+              <a:rPr lang="en-US" sz="2200" dirty="0" smtClean="0"/>
+              <a:t>IQAC </a:t>
+            </a:r>
+            <a:r>
+              <a:rPr lang="en-US" sz="2200" dirty="0" smtClean="0"/>
+              <a:t>Cluster India</a:t>
+            </a:r>
+            <a:endParaRPr lang="en-US" sz="2200" dirty="0"/>
+          </a:p>
+        </p:txBody>
+      </p:sp>
+      <p:sp>
+        <p:nvSpPr>
+          <p:cNvPr id="57" name="Rounded Rectangle 56"/>
+          <p:cNvSpPr/>
+          <p:nvPr/>
+        </p:nvSpPr>
+        <p:spPr>
+          <a:xfrm>
+            <a:off x="6415075" y="2072464"/>
+            <a:ext cx="3143271" cy="4357718"/>
+          </a:xfrm>
+          <a:prstGeom prst="roundRect">
+            <a:avLst>
+              <a:gd name="adj" fmla="val 8751"/>
+            </a:avLst>
+          </a:prstGeom>
+          <a:solidFill>
+            <a:srgbClr val="C3D0E5"/>
+          </a:solidFill>
+          <a:ln>
+            <a:noFill/>
+          </a:ln>
+          <a:effectLst>
+            <a:outerShdw blurRad="50800" dist="38100" dir="2700000" algn="tl" rotWithShape="0">
+              <a:prstClr val="black">
+                <a:alpha val="40000"/>
+              </a:prstClr>
+            </a:outerShdw>
+          </a:effectLst>
+        </p:spPr>
+        <p:style>
+          <a:lnRef idx="2">
+            <a:schemeClr val="accent1">
+              <a:shade val="50000"/>
+            </a:schemeClr>
+          </a:lnRef>
+          <a:fillRef idx="1">
+            <a:schemeClr val="accent1"/>
+          </a:fillRef>
+          <a:effectRef idx="0">
+            <a:schemeClr val="accent1"/>
+          </a:effectRef>
+          <a:fontRef idx="minor">
+            <a:schemeClr val="lt1"/>
+          </a:fontRef>
+        </p:style>
+        <p:txBody>
+          <a:bodyPr rtlCol="0" anchor="ctr"/>
+          <a:lstStyle/>
+          <a:p>
+            <a:pPr algn="ctr"/>
+            <a:endParaRPr lang="en-US" b="1" dirty="0">
+              <a:ln w="18000">
+                <a:solidFill>
+                  <a:schemeClr val="accent2">
+                    <a:satMod val="140000"/>
+                  </a:schemeClr>
+                </a:solidFill>
+                <a:prstDash val="solid"/>
+                <a:miter lim="800000"/>
+              </a:ln>
+              <a:noFill/>
+              <a:effectLst>
+                <a:outerShdw blurRad="25500" dist="23000" dir="7020000" algn="tl">
+                  <a:srgbClr val="000000">
+                    <a:alpha val="50000"/>
+                  </a:srgbClr>
+                </a:outerShdw>
+              </a:effectLst>
+            </a:endParaRPr>
+          </a:p>
+        </p:txBody>
+      </p:sp>
+      <p:sp>
+        <p:nvSpPr>
+          <p:cNvPr id="59" name="Rectangle 58"/>
+          <p:cNvSpPr/>
+          <p:nvPr/>
+        </p:nvSpPr>
+        <p:spPr>
+          <a:xfrm>
+            <a:off x="6557951" y="5501488"/>
+            <a:ext cx="2815801" cy="646331"/>
+          </a:xfrm>
+          <a:prstGeom prst="rect">
+            <a:avLst/>
+          </a:prstGeom>
+        </p:spPr>
+        <p:txBody>
+          <a:bodyPr wrap="square">
+            <a:spAutoFit/>
+          </a:bodyPr>
+          <a:lstStyle/>
+          <a:p>
+            <a:pPr algn="ctr">
+              <a:lnSpc>
+                <a:spcPct val="90000"/>
+              </a:lnSpc>
+            </a:pPr>
+            <a:r>
+              <a:rPr lang="en-US" sz="2000" dirty="0" smtClean="0"/>
+              <a:t>Resource Admin</a:t>
+            </a:r>
+          </a:p>
+          <a:p>
+            <a:pPr algn="ctr">
+              <a:lnSpc>
+                <a:spcPct val="90000"/>
+              </a:lnSpc>
+            </a:pPr>
+            <a:r>
+              <a:rPr lang="en-US" sz="2000" dirty="0" smtClean="0"/>
+              <a:t>IQAC Cluster India</a:t>
+            </a:r>
+            <a:endParaRPr lang="en-US" sz="2000" dirty="0"/>
+          </a:p>
+        </p:txBody>
+      </p:sp>
+      <p:sp>
+        <p:nvSpPr>
+          <p:cNvPr id="60" name="Rectangle 59"/>
+          <p:cNvSpPr/>
+          <p:nvPr/>
+        </p:nvSpPr>
+        <p:spPr>
+          <a:xfrm>
+            <a:off x="6415075" y="4929984"/>
+            <a:ext cx="3143272" cy="502231"/>
+          </a:xfrm>
+          <a:prstGeom prst="rect">
+            <a:avLst/>
+          </a:prstGeom>
+          <a:solidFill>
+            <a:srgbClr val="F6A944"/>
+          </a:solidFill>
+          <a:ln>
+            <a:noFill/>
+          </a:ln>
+        </p:spPr>
+        <p:style>
+          <a:lnRef idx="2">
+            <a:schemeClr val="accent1">
+              <a:shade val="50000"/>
+            </a:schemeClr>
+          </a:lnRef>
+          <a:fillRef idx="1">
+            <a:schemeClr val="accent1"/>
+          </a:fillRef>
+          <a:effectRef idx="0">
+            <a:schemeClr val="accent1"/>
+          </a:effectRef>
+          <a:fontRef idx="minor">
+            <a:schemeClr val="lt1"/>
+          </a:fontRef>
+        </p:style>
+        <p:txBody>
+          <a:bodyPr rtlCol="0" anchor="ctr"/>
+          <a:lstStyle/>
+          <a:p>
+            <a:pPr algn="ctr"/>
+            <a:endParaRPr lang="en-US" dirty="0">
+              <a:solidFill>
+                <a:schemeClr val="accent4">
+                  <a:lumMod val="40000"/>
+                  <a:lumOff val="60000"/>
+                </a:schemeClr>
+              </a:solidFill>
+            </a:endParaRPr>
+          </a:p>
+        </p:txBody>
+      </p:sp>
+      <p:sp>
+        <p:nvSpPr>
+          <p:cNvPr id="61" name="Rectangle 60"/>
+          <p:cNvSpPr/>
+          <p:nvPr/>
+        </p:nvSpPr>
+        <p:spPr>
+          <a:xfrm>
+            <a:off x="6452825" y="4929984"/>
+            <a:ext cx="3014777" cy="461665"/>
+          </a:xfrm>
+          <a:prstGeom prst="rect">
+            <a:avLst/>
+          </a:prstGeom>
+        </p:spPr>
+        <p:txBody>
+          <a:bodyPr wrap="square">
+            <a:spAutoFit/>
+          </a:bodyPr>
+          <a:lstStyle/>
+          <a:p>
+            <a:pPr algn="ctr"/>
+            <a:r>
+              <a:rPr lang="en-US" sz="2400" b="1" i="1" dirty="0" smtClean="0">
+                <a:solidFill>
+                  <a:schemeClr val="bg1"/>
+                </a:solidFill>
+              </a:rPr>
+              <a:t>Prof. Bharat </a:t>
+            </a:r>
+            <a:r>
+              <a:rPr lang="en-US" sz="2400" b="1" i="1" dirty="0" err="1" smtClean="0">
+                <a:solidFill>
+                  <a:schemeClr val="bg1"/>
+                </a:solidFill>
+              </a:rPr>
+              <a:t>Kangude</a:t>
+            </a:r>
+            <a:endParaRPr lang="en-US" sz="2400" b="1" i="1" dirty="0">
+              <a:solidFill>
+                <a:schemeClr val="bg1"/>
+              </a:solidFill>
+            </a:endParaRPr>
+          </a:p>
+        </p:txBody>
+      </p:sp>
+      <p:pic>
+        <p:nvPicPr>
+          <p:cNvPr id="62" name="Picture 3"/>
+          <p:cNvPicPr>
+            <a:picLocks noChangeAspect="1" noChangeArrowheads="1"/>
+          </p:cNvPicPr>
+          <p:nvPr/>
+        </p:nvPicPr>
+        <p:blipFill>
+          <a:blip r:embed="rId3"/>
+          <a:srcRect b="9964"/>
+          <a:stretch>
+            <a:fillRect/>
+          </a:stretch>
+        </p:blipFill>
+        <p:spPr bwMode="auto">
+          <a:xfrm>
+            <a:off x="6895834" y="2358216"/>
+            <a:ext cx="2233885" cy="2361536"/>
+          </a:xfrm>
+          <a:prstGeom prst="rect">
+            <a:avLst/>
+          </a:prstGeom>
+          <a:noFill/>
+          <a:ln w="9525">
+            <a:solidFill>
+              <a:srgbClr val="0C1B3A"/>
+            </a:solidFill>
+            <a:miter lim="800000"/>
+            <a:headEnd/>
+            <a:tailEnd/>
+          </a:ln>
+          <a:effectLst>
+            <a:softEdge rad="12700"/>
+          </a:effectLst>
+        </p:spPr>
+      </p:pic>
+      <p:sp>
+        <p:nvSpPr>
+          <p:cNvPr id="64" name="Rounded Rectangle 63"/>
+          <p:cNvSpPr/>
+          <p:nvPr/>
+        </p:nvSpPr>
+        <p:spPr>
+          <a:xfrm>
+            <a:off x="11201421" y="2072464"/>
+            <a:ext cx="3143271" cy="4357718"/>
+          </a:xfrm>
+          <a:prstGeom prst="roundRect">
+            <a:avLst>
+              <a:gd name="adj" fmla="val 8751"/>
+            </a:avLst>
+          </a:prstGeom>
+          <a:solidFill>
+            <a:srgbClr val="C3D0E5"/>
+          </a:solidFill>
+          <a:ln>
+            <a:noFill/>
+          </a:ln>
+          <a:effectLst>
+            <a:outerShdw blurRad="50800" dist="38100" dir="2700000" algn="tl" rotWithShape="0">
+              <a:prstClr val="black">
+                <a:alpha val="40000"/>
+              </a:prstClr>
+            </a:outerShdw>
+          </a:effectLst>
+        </p:spPr>
+        <p:style>
+          <a:lnRef idx="2">
+            <a:schemeClr val="accent1">
+              <a:shade val="50000"/>
+            </a:schemeClr>
+          </a:lnRef>
+          <a:fillRef idx="1">
+            <a:schemeClr val="accent1"/>
+          </a:fillRef>
+          <a:effectRef idx="0">
+            <a:schemeClr val="accent1"/>
+          </a:effectRef>
+          <a:fontRef idx="minor">
+            <a:schemeClr val="lt1"/>
+          </a:fontRef>
+        </p:style>
+        <p:txBody>
+          <a:bodyPr rtlCol="0" anchor="ctr"/>
+          <a:lstStyle/>
+          <a:p>
+            <a:pPr algn="ctr"/>
+            <a:endParaRPr lang="en-US" b="1" dirty="0">
+              <a:ln w="18000">
+                <a:solidFill>
+                  <a:schemeClr val="accent2">
+                    <a:satMod val="140000"/>
+                  </a:schemeClr>
+                </a:solidFill>
+                <a:prstDash val="solid"/>
+                <a:miter lim="800000"/>
+              </a:ln>
+              <a:noFill/>
+              <a:effectLst>
+                <a:outerShdw blurRad="25500" dist="23000" dir="7020000" algn="tl">
+                  <a:srgbClr val="000000">
+                    <a:alpha val="50000"/>
+                  </a:srgbClr>
+                </a:outerShdw>
+              </a:effectLst>
+            </a:endParaRPr>
+          </a:p>
+        </p:txBody>
+      </p:sp>
+      <p:sp>
+        <p:nvSpPr>
+          <p:cNvPr id="65" name="Rectangle 64"/>
+          <p:cNvSpPr/>
+          <p:nvPr/>
+        </p:nvSpPr>
+        <p:spPr>
+          <a:xfrm>
+            <a:off x="11344297" y="5501488"/>
+            <a:ext cx="2815801" cy="646331"/>
+          </a:xfrm>
+          <a:prstGeom prst="rect">
+            <a:avLst/>
+          </a:prstGeom>
+        </p:spPr>
+        <p:txBody>
+          <a:bodyPr wrap="square">
+            <a:spAutoFit/>
+          </a:bodyPr>
+          <a:lstStyle/>
+          <a:p>
+            <a:pPr algn="ctr">
+              <a:lnSpc>
+                <a:spcPct val="90000"/>
+              </a:lnSpc>
+            </a:pPr>
+            <a:r>
+              <a:rPr lang="en-US" sz="2000" dirty="0" smtClean="0"/>
+              <a:t>Co Founder</a:t>
+            </a:r>
+          </a:p>
+          <a:p>
+            <a:pPr algn="ctr">
+              <a:lnSpc>
+                <a:spcPct val="90000"/>
+              </a:lnSpc>
+            </a:pPr>
+            <a:r>
+              <a:rPr lang="en-US" sz="2000" dirty="0" smtClean="0"/>
+              <a:t>IQAC Cluster India</a:t>
+            </a:r>
+            <a:endParaRPr lang="en-US" sz="2000" dirty="0"/>
+          </a:p>
+        </p:txBody>
+      </p:sp>
+      <p:sp>
+        <p:nvSpPr>
+          <p:cNvPr id="66" name="Rectangle 65"/>
+          <p:cNvSpPr/>
+          <p:nvPr/>
+        </p:nvSpPr>
+        <p:spPr>
+          <a:xfrm>
+            <a:off x="11201421" y="4929984"/>
+            <a:ext cx="3143272" cy="502231"/>
+          </a:xfrm>
+          <a:prstGeom prst="rect">
+            <a:avLst/>
+          </a:prstGeom>
+          <a:solidFill>
+            <a:srgbClr val="F6A944"/>
+          </a:solidFill>
+          <a:ln>
+            <a:noFill/>
+          </a:ln>
+        </p:spPr>
+        <p:style>
+          <a:lnRef idx="2">
+            <a:schemeClr val="accent1">
+              <a:shade val="50000"/>
+            </a:schemeClr>
+          </a:lnRef>
+          <a:fillRef idx="1">
+            <a:schemeClr val="accent1"/>
+          </a:fillRef>
+          <a:effectRef idx="0">
+            <a:schemeClr val="accent1"/>
+          </a:effectRef>
+          <a:fontRef idx="minor">
+            <a:schemeClr val="lt1"/>
+          </a:fontRef>
+        </p:style>
+        <p:txBody>
+          <a:bodyPr rtlCol="0" anchor="ctr"/>
+          <a:lstStyle/>
+          <a:p>
+            <a:pPr algn="ctr"/>
+            <a:endParaRPr lang="en-US" dirty="0">
+              <a:solidFill>
+                <a:schemeClr val="accent4">
+                  <a:lumMod val="40000"/>
+                  <a:lumOff val="60000"/>
+                </a:schemeClr>
+              </a:solidFill>
+            </a:endParaRPr>
+          </a:p>
+        </p:txBody>
+      </p:sp>
+      <p:sp>
+        <p:nvSpPr>
+          <p:cNvPr id="67" name="Rectangle 66"/>
+          <p:cNvSpPr/>
+          <p:nvPr/>
+        </p:nvSpPr>
+        <p:spPr>
+          <a:xfrm>
+            <a:off x="11234245" y="4929984"/>
+            <a:ext cx="3014777" cy="461665"/>
+          </a:xfrm>
+          <a:prstGeom prst="rect">
+            <a:avLst/>
+          </a:prstGeom>
+        </p:spPr>
+        <p:txBody>
+          <a:bodyPr wrap="square">
+            <a:spAutoFit/>
+          </a:bodyPr>
+          <a:lstStyle/>
+          <a:p>
+            <a:pPr algn="ctr"/>
+            <a:r>
+              <a:rPr lang="en-US" sz="2400" b="1" i="1" dirty="0" smtClean="0">
+                <a:solidFill>
+                  <a:schemeClr val="bg1"/>
+                </a:solidFill>
+              </a:rPr>
+              <a:t>Dr. </a:t>
+            </a:r>
+            <a:r>
+              <a:rPr lang="en-US" sz="2400" b="1" i="1" dirty="0" err="1" smtClean="0">
+                <a:solidFill>
+                  <a:schemeClr val="bg1"/>
+                </a:solidFill>
+              </a:rPr>
+              <a:t>Ramdas</a:t>
+            </a:r>
+            <a:r>
+              <a:rPr lang="en-US" sz="2400" b="1" i="1" dirty="0" smtClean="0">
+                <a:solidFill>
+                  <a:schemeClr val="bg1"/>
+                </a:solidFill>
+              </a:rPr>
+              <a:t> </a:t>
+            </a:r>
+            <a:r>
+              <a:rPr lang="en-US" sz="2400" b="1" i="1" dirty="0" err="1" smtClean="0">
+                <a:solidFill>
+                  <a:schemeClr val="bg1"/>
+                </a:solidFill>
+              </a:rPr>
+              <a:t>Pawar</a:t>
+            </a:r>
+            <a:endParaRPr lang="en-US" sz="2400" b="1" i="1" dirty="0">
+              <a:solidFill>
+                <a:schemeClr val="bg1"/>
+              </a:solidFill>
+            </a:endParaRPr>
+          </a:p>
+        </p:txBody>
+      </p:sp>
+      <p:pic>
+        <p:nvPicPr>
+          <p:cNvPr id="69" name="Picture 4"/>
+          <p:cNvPicPr>
+            <a:picLocks noChangeAspect="1" noChangeArrowheads="1"/>
+          </p:cNvPicPr>
+          <p:nvPr/>
+        </p:nvPicPr>
+        <p:blipFill>
+          <a:blip r:embed="rId4"/>
+          <a:srcRect r="5348"/>
+          <a:stretch>
+            <a:fillRect/>
+          </a:stretch>
+        </p:blipFill>
+        <p:spPr bwMode="auto">
+          <a:xfrm>
+            <a:off x="11610742" y="2358216"/>
+            <a:ext cx="2301892" cy="2286016"/>
+          </a:xfrm>
+          <a:prstGeom prst="rect">
+            <a:avLst/>
+          </a:prstGeom>
+          <a:noFill/>
+          <a:ln w="9525">
+            <a:solidFill>
+              <a:srgbClr val="0C1B3A"/>
+            </a:solidFill>
+            <a:miter lim="800000"/>
+            <a:headEnd/>
+            <a:tailEnd/>
+          </a:ln>
+          <a:effectLst>
+            <a:softEdge rad="12700"/>
+          </a:effectLst>
+        </p:spPr>
+      </p:pic>
+      <p:sp>
+        <p:nvSpPr>
+          <p:cNvPr id="72" name="Rectangle 71"/>
+          <p:cNvSpPr/>
+          <p:nvPr/>
+        </p:nvSpPr>
+        <p:spPr>
+          <a:xfrm>
+            <a:off x="1485853" y="4968385"/>
+            <a:ext cx="3014777" cy="461665"/>
+          </a:xfrm>
+          <a:prstGeom prst="rect">
+            <a:avLst/>
+          </a:prstGeom>
+        </p:spPr>
+        <p:txBody>
+          <a:bodyPr wrap="square">
+            <a:spAutoFit/>
+          </a:bodyPr>
+          <a:lstStyle/>
+          <a:p>
+            <a:pPr algn="ctr"/>
+            <a:r>
+              <a:rPr lang="en-US" sz="2400" b="1" i="1" dirty="0" smtClean="0">
+                <a:solidFill>
+                  <a:schemeClr val="bg1"/>
+                </a:solidFill>
+              </a:rPr>
+              <a:t>Dr. </a:t>
+            </a:r>
+            <a:r>
+              <a:rPr lang="en-US" sz="2400" b="1" i="1" dirty="0" err="1" smtClean="0">
+                <a:solidFill>
+                  <a:schemeClr val="bg1"/>
+                </a:solidFill>
+              </a:rPr>
+              <a:t>Ayub</a:t>
+            </a:r>
+            <a:r>
+              <a:rPr lang="en-US" sz="2400" b="1" i="1" dirty="0" smtClean="0">
+                <a:solidFill>
+                  <a:schemeClr val="bg1"/>
+                </a:solidFill>
+              </a:rPr>
+              <a:t> </a:t>
+            </a:r>
+            <a:r>
+              <a:rPr lang="en-US" sz="2400" b="1" i="1" dirty="0" err="1" smtClean="0">
+                <a:solidFill>
+                  <a:schemeClr val="bg1"/>
+                </a:solidFill>
+              </a:rPr>
+              <a:t>Shaikh</a:t>
+            </a:r>
+            <a:endParaRPr lang="en-US" sz="2400" b="1" i="1" dirty="0">
+              <a:solidFill>
+                <a:schemeClr val="bg1"/>
+              </a:solidFill>
+            </a:endParaRPr>
+          </a:p>
+        </p:txBody>
+      </p:sp>
+      <p:sp>
+        <p:nvSpPr>
+          <p:cNvPr id="78" name="Rectangle 77"/>
+          <p:cNvSpPr/>
+          <p:nvPr/>
+        </p:nvSpPr>
+        <p:spPr>
+          <a:xfrm>
+            <a:off x="-14345" y="0"/>
+            <a:ext cx="16273520" cy="648000"/>
+          </a:xfrm>
+          <a:prstGeom prst="rect">
+            <a:avLst/>
+          </a:prstGeom>
+          <a:solidFill>
+            <a:srgbClr val="0C1B3A"/>
+          </a:solidFill>
+          <a:ln>
+            <a:noFill/>
+          </a:ln>
+        </p:spPr>
+        <p:style>
+          <a:lnRef idx="2">
+            <a:schemeClr val="accent1">
+              <a:shade val="50000"/>
+            </a:schemeClr>
+          </a:lnRef>
+          <a:fillRef idx="1">
+            <a:schemeClr val="accent1"/>
+          </a:fillRef>
+          <a:effectRef idx="0">
+            <a:schemeClr val="accent1"/>
+          </a:effectRef>
+          <a:fontRef idx="minor">
+            <a:schemeClr val="lt1"/>
+          </a:fontRef>
+        </p:style>
+        <p:txBody>
+          <a:bodyPr rtlCol="0" anchor="ctr"/>
+          <a:lstStyle/>
+          <a:p>
+            <a:pPr algn="ctr"/>
+            <a:endParaRPr lang="en-US" dirty="0"/>
+          </a:p>
+        </p:txBody>
+      </p:sp>
+      <p:sp>
+        <p:nvSpPr>
+          <p:cNvPr id="79" name="Rectangle 78"/>
+          <p:cNvSpPr/>
+          <p:nvPr/>
+        </p:nvSpPr>
+        <p:spPr>
+          <a:xfrm>
+            <a:off x="1985919" y="762"/>
+            <a:ext cx="1428760" cy="698688"/>
+          </a:xfrm>
+          <a:prstGeom prst="rect">
+            <a:avLst/>
+          </a:prstGeom>
+          <a:noFill/>
+          <a:ln>
+            <a:noFill/>
+          </a:ln>
+        </p:spPr>
+        <p:style>
+          <a:lnRef idx="2">
+            <a:schemeClr val="accent1">
+              <a:shade val="50000"/>
+            </a:schemeClr>
+          </a:lnRef>
+          <a:fillRef idx="1">
+            <a:schemeClr val="accent1"/>
+          </a:fillRef>
+          <a:effectRef idx="0">
+            <a:schemeClr val="accent1"/>
+          </a:effectRef>
+          <a:fontRef idx="minor">
+            <a:schemeClr val="lt1"/>
+          </a:fontRef>
+        </p:style>
+        <p:txBody>
+          <a:bodyPr rtlCol="0" anchor="ctr"/>
+          <a:lstStyle/>
+          <a:p>
+            <a:r>
+              <a:rPr lang="en-IN" sz="2000" dirty="0" smtClean="0">
+                <a:solidFill>
+                  <a:schemeClr val="bg1">
+                    <a:lumMod val="65000"/>
+                  </a:schemeClr>
+                </a:solidFill>
+              </a:rPr>
+              <a:t>13/06/2020</a:t>
+            </a:r>
+            <a:endParaRPr lang="en-US" sz="2000" dirty="0">
+              <a:solidFill>
+                <a:schemeClr val="bg1">
+                  <a:lumMod val="65000"/>
+                </a:schemeClr>
+              </a:solidFill>
+            </a:endParaRPr>
+          </a:p>
+        </p:txBody>
+      </p:sp>
+      <p:sp>
+        <p:nvSpPr>
+          <p:cNvPr id="80" name="Rectangle 79"/>
+          <p:cNvSpPr/>
+          <p:nvPr/>
+        </p:nvSpPr>
+        <p:spPr>
+          <a:xfrm>
+            <a:off x="1843043" y="108000"/>
+            <a:ext cx="13216029" cy="430887"/>
+          </a:xfrm>
+          <a:prstGeom prst="rect">
+            <a:avLst/>
+          </a:prstGeom>
+        </p:spPr>
+        <p:txBody>
+          <a:bodyPr wrap="square">
+            <a:spAutoFit/>
+          </a:bodyPr>
+          <a:lstStyle/>
+          <a:p>
+            <a:pPr algn="ctr"/>
+            <a:r>
+              <a:rPr lang="en-US" sz="2200" dirty="0" smtClean="0">
+                <a:solidFill>
+                  <a:schemeClr val="bg1"/>
+                </a:solidFill>
+              </a:rPr>
+              <a:t>An Overview of Qualitative &amp; Quantitative Metrics Of SSR and Forthcoming AQAR</a:t>
+            </a:r>
+            <a:endParaRPr lang="en-US" sz="2200" dirty="0">
+              <a:solidFill>
+                <a:schemeClr val="bg1"/>
+              </a:solidFill>
+            </a:endParaRPr>
+          </a:p>
+        </p:txBody>
+      </p:sp>
+      <p:sp>
+        <p:nvSpPr>
+          <p:cNvPr id="83" name="Rectangle 82"/>
+          <p:cNvSpPr/>
+          <p:nvPr/>
+        </p:nvSpPr>
+        <p:spPr>
+          <a:xfrm>
+            <a:off x="-28690" y="0"/>
+            <a:ext cx="157221" cy="648000"/>
+          </a:xfrm>
+          <a:prstGeom prst="rect">
+            <a:avLst/>
+          </a:prstGeom>
+          <a:solidFill>
+            <a:srgbClr val="F6A944"/>
+          </a:solidFill>
+          <a:ln>
+            <a:noFill/>
+          </a:ln>
+        </p:spPr>
+        <p:style>
+          <a:lnRef idx="2">
+            <a:schemeClr val="accent1">
+              <a:shade val="50000"/>
+            </a:schemeClr>
+          </a:lnRef>
+          <a:fillRef idx="1">
+            <a:schemeClr val="accent1"/>
+          </a:fillRef>
+          <a:effectRef idx="0">
+            <a:schemeClr val="accent1"/>
+          </a:effectRef>
+          <a:fontRef idx="minor">
+            <a:schemeClr val="lt1"/>
+          </a:fontRef>
+        </p:style>
+        <p:txBody>
+          <a:bodyPr rtlCol="0" anchor="ctr"/>
+          <a:lstStyle/>
+          <a:p>
+            <a:pPr algn="ctr"/>
+            <a:endParaRPr lang="en-US" dirty="0">
+              <a:solidFill>
+                <a:schemeClr val="accent4">
+                  <a:lumMod val="40000"/>
+                  <a:lumOff val="60000"/>
+                </a:schemeClr>
+              </a:solidFill>
+            </a:endParaRPr>
+          </a:p>
+        </p:txBody>
+      </p:sp>
+      <p:cxnSp>
+        <p:nvCxnSpPr>
+          <p:cNvPr id="86" name="Straight Connector 85"/>
+          <p:cNvCxnSpPr/>
+          <p:nvPr/>
+        </p:nvCxnSpPr>
+        <p:spPr>
+          <a:xfrm rot="5400000">
+            <a:off x="3342828" y="285339"/>
+            <a:ext cx="427866" cy="1588"/>
+          </a:xfrm>
+          <a:prstGeom prst="line">
+            <a:avLst/>
+          </a:prstGeom>
+          <a:ln>
+            <a:solidFill>
+              <a:srgbClr val="F6A944"/>
+            </a:solidFill>
+          </a:ln>
+        </p:spPr>
+        <p:style>
+          <a:lnRef idx="1">
+            <a:schemeClr val="accent6"/>
+          </a:lnRef>
+          <a:fillRef idx="0">
+            <a:schemeClr val="accent6"/>
+          </a:fillRef>
+          <a:effectRef idx="0">
+            <a:schemeClr val="accent6"/>
+          </a:effectRef>
+          <a:fontRef idx="minor">
+            <a:schemeClr val="tx1"/>
+          </a:fontRef>
+        </p:style>
+      </p:cxnSp>
     </p:spTree>
   </p:cSld>
   <p:clrMapOvr>

</xml_diff>